<commit_message>
More of the presentation
doing this before I forget
</commit_message>
<xml_diff>
--- a/Presentation/Project Presentation.pptx
+++ b/Presentation/Project Presentation.pptx
@@ -319,7 +319,7 @@
           <a:p>
             <a:fld id="{679BC7E7-EA8E-4DA7-915E-CC098D9BADCB}" type="datetimeFigureOut">
               <a:rPr lang="en-US" smtClean="0"/>
-              <a:t>3/8/16</a:t>
+              <a:t>3/10/16</a:t>
             </a:fld>
             <a:endParaRPr lang="en-US"/>
           </a:p>
@@ -448,7 +448,7 @@
           <a:p>
             <a:fld id="{679BC7E7-EA8E-4DA7-915E-CC098D9BADCB}" type="datetimeFigureOut">
               <a:rPr lang="en-US" smtClean="0"/>
-              <a:t>3/8/16</a:t>
+              <a:t>3/10/16</a:t>
             </a:fld>
             <a:endParaRPr lang="en-US"/>
           </a:p>
@@ -781,7 +781,7 @@
           <a:p>
             <a:fld id="{679BC7E7-EA8E-4DA7-915E-CC098D9BADCB}" type="datetimeFigureOut">
               <a:rPr lang="en-US" smtClean="0"/>
-              <a:t>3/8/16</a:t>
+              <a:t>3/10/16</a:t>
             </a:fld>
             <a:endParaRPr lang="en-US"/>
           </a:p>
@@ -1006,7 +1006,7 @@
           <a:p>
             <a:fld id="{679BC7E7-EA8E-4DA7-915E-CC098D9BADCB}" type="datetimeFigureOut">
               <a:rPr lang="en-US" smtClean="0"/>
-              <a:t>3/8/16</a:t>
+              <a:t>3/10/16</a:t>
             </a:fld>
             <a:endParaRPr lang="en-US"/>
           </a:p>
@@ -1276,7 +1276,7 @@
           <a:p>
             <a:fld id="{679BC7E7-EA8E-4DA7-915E-CC098D9BADCB}" type="datetimeFigureOut">
               <a:rPr lang="en-US" smtClean="0"/>
-              <a:t>3/8/16</a:t>
+              <a:t>3/10/16</a:t>
             </a:fld>
             <a:endParaRPr lang="en-US"/>
           </a:p>
@@ -1629,7 +1629,7 @@
           <a:p>
             <a:fld id="{679BC7E7-EA8E-4DA7-915E-CC098D9BADCB}" type="datetimeFigureOut">
               <a:rPr lang="en-US" smtClean="0"/>
-              <a:t>3/8/16</a:t>
+              <a:t>3/10/16</a:t>
             </a:fld>
             <a:endParaRPr lang="en-US"/>
           </a:p>
@@ -1850,7 +1850,7 @@
           <a:p>
             <a:fld id="{679BC7E7-EA8E-4DA7-915E-CC098D9BADCB}" type="datetimeFigureOut">
               <a:rPr lang="en-US" smtClean="0"/>
-              <a:t>3/8/16</a:t>
+              <a:t>3/10/16</a:t>
             </a:fld>
             <a:endParaRPr lang="en-US"/>
           </a:p>
@@ -1954,7 +1954,7 @@
           <a:p>
             <a:fld id="{679BC7E7-EA8E-4DA7-915E-CC098D9BADCB}" type="datetimeFigureOut">
               <a:rPr lang="en-US" smtClean="0"/>
-              <a:t>3/8/16</a:t>
+              <a:t>3/10/16</a:t>
             </a:fld>
             <a:endParaRPr lang="en-US"/>
           </a:p>
@@ -2151,7 +2151,7 @@
           <a:p>
             <a:fld id="{679BC7E7-EA8E-4DA7-915E-CC098D9BADCB}" type="datetimeFigureOut">
               <a:rPr lang="en-US" smtClean="0"/>
-              <a:t>3/8/16</a:t>
+              <a:t>3/10/16</a:t>
             </a:fld>
             <a:endParaRPr lang="en-US"/>
           </a:p>
@@ -2415,7 +2415,7 @@
           <a:p>
             <a:fld id="{679BC7E7-EA8E-4DA7-915E-CC098D9BADCB}" type="datetimeFigureOut">
               <a:rPr lang="en-US" smtClean="0"/>
-              <a:t>3/8/16</a:t>
+              <a:t>3/10/16</a:t>
             </a:fld>
             <a:endParaRPr lang="en-US"/>
           </a:p>
@@ -2805,7 +2805,7 @@
           <a:p>
             <a:fld id="{679BC7E7-EA8E-4DA7-915E-CC098D9BADCB}" type="datetimeFigureOut">
               <a:rPr lang="en-US" smtClean="0"/>
-              <a:t>3/8/16</a:t>
+              <a:t>3/10/16</a:t>
             </a:fld>
             <a:endParaRPr lang="en-US"/>
           </a:p>
@@ -3302,7 +3302,7 @@
           <a:p>
             <a:fld id="{679BC7E7-EA8E-4DA7-915E-CC098D9BADCB}" type="datetimeFigureOut">
               <a:rPr lang="en-US" smtClean="0"/>
-              <a:t>3/8/16</a:t>
+              <a:t>3/10/16</a:t>
             </a:fld>
             <a:endParaRPr lang="en-US"/>
           </a:p>
@@ -3528,7 +3528,7 @@
           <a:p>
             <a:fld id="{679BC7E7-EA8E-4DA7-915E-CC098D9BADCB}" type="datetimeFigureOut">
               <a:rPr lang="en-US" smtClean="0"/>
-              <a:t>3/8/16</a:t>
+              <a:t>3/10/16</a:t>
             </a:fld>
             <a:endParaRPr lang="en-US"/>
           </a:p>
@@ -3867,7 +3867,7 @@
           <a:p>
             <a:fld id="{679BC7E7-EA8E-4DA7-915E-CC098D9BADCB}" type="datetimeFigureOut">
               <a:rPr lang="en-US" smtClean="0"/>
-              <a:t>3/8/16</a:t>
+              <a:t>3/10/16</a:t>
             </a:fld>
             <a:endParaRPr lang="en-US"/>
           </a:p>
@@ -4319,7 +4319,7 @@
           <a:p>
             <a:fld id="{679BC7E7-EA8E-4DA7-915E-CC098D9BADCB}" type="datetimeFigureOut">
               <a:rPr lang="en-US" smtClean="0"/>
-              <a:t>3/8/16</a:t>
+              <a:t>3/10/16</a:t>
             </a:fld>
             <a:endParaRPr lang="en-US"/>
           </a:p>
@@ -4902,7 +4902,7 @@
           <a:p>
             <a:fld id="{679BC7E7-EA8E-4DA7-915E-CC098D9BADCB}" type="datetimeFigureOut">
               <a:rPr lang="en-US" smtClean="0"/>
-              <a:t>3/8/16</a:t>
+              <a:t>3/10/16</a:t>
             </a:fld>
             <a:endParaRPr lang="en-US"/>
           </a:p>
@@ -5139,7 +5139,7 @@
           <a:p>
             <a:fld id="{679BC7E7-EA8E-4DA7-915E-CC098D9BADCB}" type="datetimeFigureOut">
               <a:rPr lang="en-US" smtClean="0"/>
-              <a:t>3/8/16</a:t>
+              <a:t>3/10/16</a:t>
             </a:fld>
             <a:endParaRPr lang="en-US"/>
           </a:p>
@@ -5636,12 +5636,49 @@
           </a:xfrm>
         </p:spPr>
         <p:txBody>
-          <a:bodyPr/>
-          <a:lstStyle/>
-          <a:p>
-            <a:r>
-              <a:rPr lang="en-US" dirty="0" smtClean="0"/>
-              <a:t>char broiled; group members:</a:t>
+          <a:bodyPr>
+            <a:normAutofit/>
+          </a:bodyPr>
+          <a:lstStyle/>
+          <a:p>
+            <a:r>
+              <a:rPr lang="en-US" dirty="0" smtClean="0"/>
+              <a:t>Brough</a:t>
+            </a:r>
+            <a:r>
+              <a:rPr lang="en-US" dirty="0" smtClean="0"/>
+              <a:t>t to you by: </a:t>
+            </a:r>
+            <a:r>
+              <a:rPr lang="en-US" dirty="0" smtClean="0"/>
+              <a:t>char </a:t>
+            </a:r>
+            <a:r>
+              <a:rPr lang="en-US" dirty="0" smtClean="0"/>
+              <a:t>broiled; </a:t>
+            </a:r>
+            <a:endParaRPr lang="en-US" dirty="0" smtClean="0"/>
+          </a:p>
+          <a:p>
+            <a:r>
+              <a:rPr lang="en-US" dirty="0"/>
+              <a:t>G</a:t>
+            </a:r>
+            <a:r>
+              <a:rPr lang="en-US" dirty="0" smtClean="0"/>
+              <a:t>roup </a:t>
+            </a:r>
+            <a:r>
+              <a:rPr lang="en-US" dirty="0"/>
+              <a:t>M</a:t>
+            </a:r>
+            <a:r>
+              <a:rPr lang="en-US" dirty="0" smtClean="0"/>
+              <a:t>embers</a:t>
+            </a:r>
+            <a:r>
+              <a:rPr lang="en-US" dirty="0" smtClean="0"/>
+              <a:t>:</a:t>
             </a:r>
           </a:p>
           <a:p>
@@ -5691,7 +5728,7 @@
         </p:blipFill>
         <p:spPr>
           <a:xfrm>
-            <a:off x="3025691" y="3433383"/>
+            <a:off x="3025691" y="3570355"/>
             <a:ext cx="3100865" cy="3100865"/>
           </a:xfrm>
           <a:prstGeom prst="rect">
@@ -5915,7 +5952,11 @@
           <a:p>
             <a:r>
               <a:rPr lang="en-US" dirty="0" smtClean="0"/>
-              <a:t>Chat Client</a:t>
+              <a:t>Chat </a:t>
+            </a:r>
+            <a:r>
+              <a:rPr lang="en-US" dirty="0" smtClean="0"/>
+              <a:t>Server/Client</a:t>
             </a:r>
             <a:endParaRPr lang="en-US" dirty="0"/>
           </a:p>
@@ -6469,10 +6510,63 @@
         </p:nvSpPr>
         <p:spPr/>
         <p:txBody>
-          <a:bodyPr/>
-          <a:lstStyle/>
-          <a:p>
-            <a:endParaRPr lang="en-US" dirty="0"/>
+          <a:bodyPr>
+            <a:normAutofit/>
+          </a:bodyPr>
+          <a:lstStyle/>
+          <a:p>
+            <a:pPr marL="342900" indent="-342900">
+              <a:buFont typeface="Arial"/>
+              <a:buChar char="•"/>
+            </a:pPr>
+            <a:r>
+              <a:rPr lang="en-US" sz="2800" dirty="0" smtClean="0"/>
+              <a:t>Server/Client Chat</a:t>
+            </a:r>
+          </a:p>
+          <a:p>
+            <a:pPr marL="342900" indent="-342900">
+              <a:buFont typeface="Arial"/>
+              <a:buChar char="•"/>
+            </a:pPr>
+            <a:r>
+              <a:rPr lang="en-US" sz="2800" dirty="0" smtClean="0"/>
+              <a:t>Encryption </a:t>
+            </a:r>
+          </a:p>
+          <a:p>
+            <a:pPr marL="342900" indent="-342900">
+              <a:buFont typeface="Arial"/>
+              <a:buChar char="•"/>
+            </a:pPr>
+            <a:r>
+              <a:rPr lang="en-US" sz="2800" dirty="0" smtClean="0"/>
+              <a:t>Meme-</a:t>
+            </a:r>
+            <a:r>
+              <a:rPr lang="en-US" sz="2800" dirty="0" err="1" smtClean="0"/>
+              <a:t>afy</a:t>
+            </a:r>
+            <a:endParaRPr lang="en-US" sz="2800" dirty="0" smtClean="0"/>
+          </a:p>
+          <a:p>
+            <a:pPr marL="342900" indent="-342900">
+              <a:buFont typeface="Arial"/>
+              <a:buChar char="•"/>
+            </a:pPr>
+            <a:r>
+              <a:rPr lang="en-US" sz="2800" dirty="0" err="1" smtClean="0"/>
+              <a:t>Qt</a:t>
+            </a:r>
+            <a:r>
+              <a:rPr lang="en-US" sz="2800" dirty="0" smtClean="0"/>
+              <a:t> </a:t>
+            </a:r>
+            <a:r>
+              <a:rPr lang="en-US" sz="2800" dirty="0" err="1" smtClean="0"/>
+              <a:t>Gui</a:t>
+            </a:r>
+            <a:endParaRPr lang="en-US" sz="2800" dirty="0"/>
           </a:p>
         </p:txBody>
       </p:sp>
@@ -6762,25 +6856,6 @@
           </a:p>
         </p:txBody>
       </p:sp>
-      <p:sp>
-        <p:nvSpPr>
-          <p:cNvPr id="3" name="Text Placeholder 2"/>
-          <p:cNvSpPr>
-            <a:spLocks noGrp="1"/>
-          </p:cNvSpPr>
-          <p:nvPr>
-            <p:ph type="body" sz="half" idx="2"/>
-          </p:nvPr>
-        </p:nvSpPr>
-        <p:spPr/>
-        <p:txBody>
-          <a:bodyPr/>
-          <a:lstStyle/>
-          <a:p>
-            <a:endParaRPr lang="en-US" dirty="0"/>
-          </a:p>
-        </p:txBody>
-      </p:sp>
       <p:pic>
         <p:nvPicPr>
           <p:cNvPr id="5" name="Picture Placeholder 4" descr="d6232682-e0e0-4e01-b792-67cd8fe8ee2f.jpg"/>
@@ -7002,6 +7077,78 @@
                 </a:outerShdw>
               </a:effectLst>
             </a:endParaRPr>
+          </a:p>
+        </p:txBody>
+      </p:sp>
+      <p:sp>
+        <p:nvSpPr>
+          <p:cNvPr id="8" name="Text Placeholder 2"/>
+          <p:cNvSpPr>
+            <a:spLocks noGrp="1"/>
+          </p:cNvSpPr>
+          <p:nvPr>
+            <p:ph type="body" sz="half" idx="2"/>
+          </p:nvPr>
+        </p:nvSpPr>
+        <p:spPr/>
+        <p:txBody>
+          <a:bodyPr>
+            <a:normAutofit/>
+          </a:bodyPr>
+          <a:lstStyle/>
+          <a:p>
+            <a:pPr marL="342900" indent="-342900">
+              <a:buFont typeface="Arial"/>
+              <a:buChar char="•"/>
+            </a:pPr>
+            <a:r>
+              <a:rPr lang="en-US" sz="2800" dirty="0" smtClean="0"/>
+              <a:t>Server/Client Chat</a:t>
+            </a:r>
+          </a:p>
+          <a:p>
+            <a:pPr marL="342900" indent="-342900">
+              <a:buFont typeface="Arial"/>
+              <a:buChar char="•"/>
+            </a:pPr>
+            <a:r>
+              <a:rPr lang="en-US" sz="2800" dirty="0" smtClean="0"/>
+              <a:t>Encryption </a:t>
+            </a:r>
+          </a:p>
+          <a:p>
+            <a:pPr marL="342900" indent="-342900">
+              <a:buFont typeface="Arial"/>
+              <a:buChar char="•"/>
+            </a:pPr>
+            <a:r>
+              <a:rPr lang="en-US" sz="2800" dirty="0" smtClean="0"/>
+              <a:t>Meme-</a:t>
+            </a:r>
+            <a:r>
+              <a:rPr lang="en-US" sz="2800" dirty="0" err="1" smtClean="0"/>
+              <a:t>afy</a:t>
+            </a:r>
+            <a:endParaRPr lang="en-US" sz="2800" dirty="0" smtClean="0"/>
+          </a:p>
+          <a:p>
+            <a:pPr marL="342900" indent="-342900">
+              <a:buFont typeface="Arial"/>
+              <a:buChar char="•"/>
+            </a:pPr>
+            <a:r>
+              <a:rPr lang="en-US" sz="2800" dirty="0" err="1" smtClean="0"/>
+              <a:t>Qt</a:t>
+            </a:r>
+            <a:r>
+              <a:rPr lang="en-US" sz="2800" dirty="0" smtClean="0"/>
+              <a:t> </a:t>
+            </a:r>
+            <a:r>
+              <a:rPr lang="en-US" sz="2800" dirty="0" err="1" smtClean="0"/>
+              <a:t>Gui</a:t>
+            </a:r>
+            <a:endParaRPr lang="en-US" sz="2800" dirty="0"/>
           </a:p>
         </p:txBody>
       </p:sp>
@@ -7065,25 +7212,6 @@
           </a:p>
         </p:txBody>
       </p:sp>
-      <p:sp>
-        <p:nvSpPr>
-          <p:cNvPr id="3" name="Text Placeholder 2"/>
-          <p:cNvSpPr>
-            <a:spLocks noGrp="1"/>
-          </p:cNvSpPr>
-          <p:nvPr>
-            <p:ph type="body" sz="half" idx="2"/>
-          </p:nvPr>
-        </p:nvSpPr>
-        <p:spPr/>
-        <p:txBody>
-          <a:bodyPr/>
-          <a:lstStyle/>
-          <a:p>
-            <a:endParaRPr lang="en-US" dirty="0"/>
-          </a:p>
-        </p:txBody>
-      </p:sp>
       <p:pic>
         <p:nvPicPr>
           <p:cNvPr id="5" name="Picture Placeholder 4" descr="d6232682-e0e0-4e01-b792-67cd8fe8ee2f.jpg"/>
@@ -7305,6 +7433,78 @@
                 </a:outerShdw>
               </a:effectLst>
             </a:endParaRPr>
+          </a:p>
+        </p:txBody>
+      </p:sp>
+      <p:sp>
+        <p:nvSpPr>
+          <p:cNvPr id="9" name="Text Placeholder 2"/>
+          <p:cNvSpPr>
+            <a:spLocks noGrp="1"/>
+          </p:cNvSpPr>
+          <p:nvPr>
+            <p:ph type="body" sz="half" idx="2"/>
+          </p:nvPr>
+        </p:nvSpPr>
+        <p:spPr/>
+        <p:txBody>
+          <a:bodyPr>
+            <a:normAutofit/>
+          </a:bodyPr>
+          <a:lstStyle/>
+          <a:p>
+            <a:pPr marL="342900" indent="-342900">
+              <a:buFont typeface="Arial"/>
+              <a:buChar char="•"/>
+            </a:pPr>
+            <a:r>
+              <a:rPr lang="en-US" sz="2800" dirty="0" smtClean="0"/>
+              <a:t>Server/Client Chat</a:t>
+            </a:r>
+          </a:p>
+          <a:p>
+            <a:pPr marL="342900" indent="-342900">
+              <a:buFont typeface="Arial"/>
+              <a:buChar char="•"/>
+            </a:pPr>
+            <a:r>
+              <a:rPr lang="en-US" sz="2800" dirty="0" smtClean="0"/>
+              <a:t>Encryption </a:t>
+            </a:r>
+          </a:p>
+          <a:p>
+            <a:pPr marL="342900" indent="-342900">
+              <a:buFont typeface="Arial"/>
+              <a:buChar char="•"/>
+            </a:pPr>
+            <a:r>
+              <a:rPr lang="en-US" sz="2800" dirty="0" smtClean="0"/>
+              <a:t>Meme-</a:t>
+            </a:r>
+            <a:r>
+              <a:rPr lang="en-US" sz="2800" dirty="0" err="1" smtClean="0"/>
+              <a:t>afy</a:t>
+            </a:r>
+            <a:endParaRPr lang="en-US" sz="2800" dirty="0" smtClean="0"/>
+          </a:p>
+          <a:p>
+            <a:pPr marL="342900" indent="-342900">
+              <a:buFont typeface="Arial"/>
+              <a:buChar char="•"/>
+            </a:pPr>
+            <a:r>
+              <a:rPr lang="en-US" sz="2800" dirty="0" err="1" smtClean="0"/>
+              <a:t>Qt</a:t>
+            </a:r>
+            <a:r>
+              <a:rPr lang="en-US" sz="2800" dirty="0" smtClean="0"/>
+              <a:t> </a:t>
+            </a:r>
+            <a:r>
+              <a:rPr lang="en-US" sz="2800" dirty="0" err="1" smtClean="0"/>
+              <a:t>Gui</a:t>
+            </a:r>
+            <a:endParaRPr lang="en-US" sz="2800" dirty="0"/>
           </a:p>
         </p:txBody>
       </p:sp>
@@ -7368,25 +7568,6 @@
           </a:p>
         </p:txBody>
       </p:sp>
-      <p:sp>
-        <p:nvSpPr>
-          <p:cNvPr id="3" name="Text Placeholder 2"/>
-          <p:cNvSpPr>
-            <a:spLocks noGrp="1"/>
-          </p:cNvSpPr>
-          <p:nvPr>
-            <p:ph type="body" sz="half" idx="2"/>
-          </p:nvPr>
-        </p:nvSpPr>
-        <p:spPr/>
-        <p:txBody>
-          <a:bodyPr/>
-          <a:lstStyle/>
-          <a:p>
-            <a:endParaRPr lang="en-US" dirty="0"/>
-          </a:p>
-        </p:txBody>
-      </p:sp>
       <p:pic>
         <p:nvPicPr>
           <p:cNvPr id="5" name="Picture Placeholder 4" descr="d6232682-e0e0-4e01-b792-67cd8fe8ee2f.jpg"/>
@@ -7608,6 +7789,78 @@
                 </a:outerShdw>
               </a:effectLst>
             </a:endParaRPr>
+          </a:p>
+        </p:txBody>
+      </p:sp>
+      <p:sp>
+        <p:nvSpPr>
+          <p:cNvPr id="8" name="Text Placeholder 2"/>
+          <p:cNvSpPr>
+            <a:spLocks noGrp="1"/>
+          </p:cNvSpPr>
+          <p:nvPr>
+            <p:ph type="body" sz="half" idx="2"/>
+          </p:nvPr>
+        </p:nvSpPr>
+        <p:spPr/>
+        <p:txBody>
+          <a:bodyPr>
+            <a:normAutofit/>
+          </a:bodyPr>
+          <a:lstStyle/>
+          <a:p>
+            <a:pPr marL="342900" indent="-342900">
+              <a:buFont typeface="Arial"/>
+              <a:buChar char="•"/>
+            </a:pPr>
+            <a:r>
+              <a:rPr lang="en-US" sz="2800" dirty="0" smtClean="0"/>
+              <a:t>Server/Client Chat</a:t>
+            </a:r>
+          </a:p>
+          <a:p>
+            <a:pPr marL="342900" indent="-342900">
+              <a:buFont typeface="Arial"/>
+              <a:buChar char="•"/>
+            </a:pPr>
+            <a:r>
+              <a:rPr lang="en-US" sz="2800" dirty="0" smtClean="0"/>
+              <a:t>Encryption </a:t>
+            </a:r>
+          </a:p>
+          <a:p>
+            <a:pPr marL="342900" indent="-342900">
+              <a:buFont typeface="Arial"/>
+              <a:buChar char="•"/>
+            </a:pPr>
+            <a:r>
+              <a:rPr lang="en-US" sz="2800" dirty="0" smtClean="0"/>
+              <a:t>Meme-</a:t>
+            </a:r>
+            <a:r>
+              <a:rPr lang="en-US" sz="2800" dirty="0" err="1" smtClean="0"/>
+              <a:t>afy</a:t>
+            </a:r>
+            <a:endParaRPr lang="en-US" sz="2800" dirty="0" smtClean="0"/>
+          </a:p>
+          <a:p>
+            <a:pPr marL="342900" indent="-342900">
+              <a:buFont typeface="Arial"/>
+              <a:buChar char="•"/>
+            </a:pPr>
+            <a:r>
+              <a:rPr lang="en-US" sz="2800" dirty="0" err="1" smtClean="0"/>
+              <a:t>Qt</a:t>
+            </a:r>
+            <a:r>
+              <a:rPr lang="en-US" sz="2800" dirty="0" smtClean="0"/>
+              <a:t> </a:t>
+            </a:r>
+            <a:r>
+              <a:rPr lang="en-US" sz="2800" dirty="0" err="1" smtClean="0"/>
+              <a:t>Gui</a:t>
+            </a:r>
+            <a:endParaRPr lang="en-US" sz="2800" dirty="0"/>
           </a:p>
         </p:txBody>
       </p:sp>
@@ -7671,25 +7924,6 @@
           </a:p>
         </p:txBody>
       </p:sp>
-      <p:sp>
-        <p:nvSpPr>
-          <p:cNvPr id="3" name="Text Placeholder 2"/>
-          <p:cNvSpPr>
-            <a:spLocks noGrp="1"/>
-          </p:cNvSpPr>
-          <p:nvPr>
-            <p:ph type="body" sz="half" idx="2"/>
-          </p:nvPr>
-        </p:nvSpPr>
-        <p:spPr/>
-        <p:txBody>
-          <a:bodyPr/>
-          <a:lstStyle/>
-          <a:p>
-            <a:endParaRPr lang="en-US" dirty="0"/>
-          </a:p>
-        </p:txBody>
-      </p:sp>
       <p:pic>
         <p:nvPicPr>
           <p:cNvPr id="5" name="Picture Placeholder 4" descr="d6232682-e0e0-4e01-b792-67cd8fe8ee2f.jpg"/>
@@ -7911,6 +8145,78 @@
                 </a:outerShdw>
               </a:effectLst>
             </a:endParaRPr>
+          </a:p>
+        </p:txBody>
+      </p:sp>
+      <p:sp>
+        <p:nvSpPr>
+          <p:cNvPr id="8" name="Text Placeholder 2"/>
+          <p:cNvSpPr>
+            <a:spLocks noGrp="1"/>
+          </p:cNvSpPr>
+          <p:nvPr>
+            <p:ph type="body" sz="half" idx="2"/>
+          </p:nvPr>
+        </p:nvSpPr>
+        <p:spPr/>
+        <p:txBody>
+          <a:bodyPr>
+            <a:normAutofit/>
+          </a:bodyPr>
+          <a:lstStyle/>
+          <a:p>
+            <a:pPr marL="342900" indent="-342900">
+              <a:buFont typeface="Arial"/>
+              <a:buChar char="•"/>
+            </a:pPr>
+            <a:r>
+              <a:rPr lang="en-US" sz="2800" dirty="0" smtClean="0"/>
+              <a:t>Server/Client Chat</a:t>
+            </a:r>
+          </a:p>
+          <a:p>
+            <a:pPr marL="342900" indent="-342900">
+              <a:buFont typeface="Arial"/>
+              <a:buChar char="•"/>
+            </a:pPr>
+            <a:r>
+              <a:rPr lang="en-US" sz="2800" dirty="0" smtClean="0"/>
+              <a:t>Encryption </a:t>
+            </a:r>
+          </a:p>
+          <a:p>
+            <a:pPr marL="342900" indent="-342900">
+              <a:buFont typeface="Arial"/>
+              <a:buChar char="•"/>
+            </a:pPr>
+            <a:r>
+              <a:rPr lang="en-US" sz="2800" dirty="0" smtClean="0"/>
+              <a:t>Meme-</a:t>
+            </a:r>
+            <a:r>
+              <a:rPr lang="en-US" sz="2800" dirty="0" err="1" smtClean="0"/>
+              <a:t>afy</a:t>
+            </a:r>
+            <a:endParaRPr lang="en-US" sz="2800" dirty="0" smtClean="0"/>
+          </a:p>
+          <a:p>
+            <a:pPr marL="342900" indent="-342900">
+              <a:buFont typeface="Arial"/>
+              <a:buChar char="•"/>
+            </a:pPr>
+            <a:r>
+              <a:rPr lang="en-US" sz="2800" dirty="0" err="1" smtClean="0"/>
+              <a:t>Qt</a:t>
+            </a:r>
+            <a:r>
+              <a:rPr lang="en-US" sz="2800" dirty="0" smtClean="0"/>
+              <a:t> </a:t>
+            </a:r>
+            <a:r>
+              <a:rPr lang="en-US" sz="2800" dirty="0" err="1" smtClean="0"/>
+              <a:t>Gui</a:t>
+            </a:r>
+            <a:endParaRPr lang="en-US" sz="2800" dirty="0"/>
           </a:p>
         </p:txBody>
       </p:sp>
@@ -7974,25 +8280,6 @@
           </a:p>
         </p:txBody>
       </p:sp>
-      <p:sp>
-        <p:nvSpPr>
-          <p:cNvPr id="3" name="Text Placeholder 2"/>
-          <p:cNvSpPr>
-            <a:spLocks noGrp="1"/>
-          </p:cNvSpPr>
-          <p:nvPr>
-            <p:ph type="body" sz="half" idx="2"/>
-          </p:nvPr>
-        </p:nvSpPr>
-        <p:spPr/>
-        <p:txBody>
-          <a:bodyPr/>
-          <a:lstStyle/>
-          <a:p>
-            <a:endParaRPr lang="en-US" dirty="0"/>
-          </a:p>
-        </p:txBody>
-      </p:sp>
       <p:pic>
         <p:nvPicPr>
           <p:cNvPr id="5" name="Picture Placeholder 4" descr="d6232682-e0e0-4e01-b792-67cd8fe8ee2f.jpg"/>
@@ -8214,6 +8501,78 @@
                 </a:outerShdw>
               </a:effectLst>
             </a:endParaRPr>
+          </a:p>
+        </p:txBody>
+      </p:sp>
+      <p:sp>
+        <p:nvSpPr>
+          <p:cNvPr id="8" name="Text Placeholder 2"/>
+          <p:cNvSpPr>
+            <a:spLocks noGrp="1"/>
+          </p:cNvSpPr>
+          <p:nvPr>
+            <p:ph type="body" sz="half" idx="2"/>
+          </p:nvPr>
+        </p:nvSpPr>
+        <p:spPr/>
+        <p:txBody>
+          <a:bodyPr>
+            <a:normAutofit/>
+          </a:bodyPr>
+          <a:lstStyle/>
+          <a:p>
+            <a:pPr marL="342900" indent="-342900">
+              <a:buFont typeface="Arial"/>
+              <a:buChar char="•"/>
+            </a:pPr>
+            <a:r>
+              <a:rPr lang="en-US" sz="2800" dirty="0" smtClean="0"/>
+              <a:t>Server/Client Chat</a:t>
+            </a:r>
+          </a:p>
+          <a:p>
+            <a:pPr marL="342900" indent="-342900">
+              <a:buFont typeface="Arial"/>
+              <a:buChar char="•"/>
+            </a:pPr>
+            <a:r>
+              <a:rPr lang="en-US" sz="2800" dirty="0" smtClean="0"/>
+              <a:t>Encryption </a:t>
+            </a:r>
+          </a:p>
+          <a:p>
+            <a:pPr marL="342900" indent="-342900">
+              <a:buFont typeface="Arial"/>
+              <a:buChar char="•"/>
+            </a:pPr>
+            <a:r>
+              <a:rPr lang="en-US" sz="2800" dirty="0" smtClean="0"/>
+              <a:t>Meme-</a:t>
+            </a:r>
+            <a:r>
+              <a:rPr lang="en-US" sz="2800" dirty="0" err="1" smtClean="0"/>
+              <a:t>afy</a:t>
+            </a:r>
+            <a:endParaRPr lang="en-US" sz="2800" dirty="0" smtClean="0"/>
+          </a:p>
+          <a:p>
+            <a:pPr marL="342900" indent="-342900">
+              <a:buFont typeface="Arial"/>
+              <a:buChar char="•"/>
+            </a:pPr>
+            <a:r>
+              <a:rPr lang="en-US" sz="2800" dirty="0" err="1" smtClean="0"/>
+              <a:t>Qt</a:t>
+            </a:r>
+            <a:r>
+              <a:rPr lang="en-US" sz="2800" dirty="0" smtClean="0"/>
+              <a:t> </a:t>
+            </a:r>
+            <a:r>
+              <a:rPr lang="en-US" sz="2800" dirty="0" err="1" smtClean="0"/>
+              <a:t>Gui</a:t>
+            </a:r>
+            <a:endParaRPr lang="en-US" sz="2800" dirty="0"/>
           </a:p>
         </p:txBody>
       </p:sp>
@@ -8277,25 +8636,6 @@
           </a:p>
         </p:txBody>
       </p:sp>
-      <p:sp>
-        <p:nvSpPr>
-          <p:cNvPr id="3" name="Text Placeholder 2"/>
-          <p:cNvSpPr>
-            <a:spLocks noGrp="1"/>
-          </p:cNvSpPr>
-          <p:nvPr>
-            <p:ph type="body" sz="half" idx="2"/>
-          </p:nvPr>
-        </p:nvSpPr>
-        <p:spPr/>
-        <p:txBody>
-          <a:bodyPr/>
-          <a:lstStyle/>
-          <a:p>
-            <a:endParaRPr lang="en-US" dirty="0"/>
-          </a:p>
-        </p:txBody>
-      </p:sp>
       <p:pic>
         <p:nvPicPr>
           <p:cNvPr id="5" name="Picture Placeholder 4" descr="d6232682-e0e0-4e01-b792-67cd8fe8ee2f.jpg"/>
@@ -8517,6 +8857,78 @@
                 </a:outerShdw>
               </a:effectLst>
             </a:endParaRPr>
+          </a:p>
+        </p:txBody>
+      </p:sp>
+      <p:sp>
+        <p:nvSpPr>
+          <p:cNvPr id="8" name="Text Placeholder 2"/>
+          <p:cNvSpPr>
+            <a:spLocks noGrp="1"/>
+          </p:cNvSpPr>
+          <p:nvPr>
+            <p:ph type="body" sz="half" idx="2"/>
+          </p:nvPr>
+        </p:nvSpPr>
+        <p:spPr/>
+        <p:txBody>
+          <a:bodyPr>
+            <a:normAutofit/>
+          </a:bodyPr>
+          <a:lstStyle/>
+          <a:p>
+            <a:pPr marL="342900" indent="-342900">
+              <a:buFont typeface="Arial"/>
+              <a:buChar char="•"/>
+            </a:pPr>
+            <a:r>
+              <a:rPr lang="en-US" sz="2800" dirty="0" smtClean="0"/>
+              <a:t>Server/Client Chat</a:t>
+            </a:r>
+          </a:p>
+          <a:p>
+            <a:pPr marL="342900" indent="-342900">
+              <a:buFont typeface="Arial"/>
+              <a:buChar char="•"/>
+            </a:pPr>
+            <a:r>
+              <a:rPr lang="en-US" sz="2800" dirty="0" smtClean="0"/>
+              <a:t>Encryption </a:t>
+            </a:r>
+          </a:p>
+          <a:p>
+            <a:pPr marL="342900" indent="-342900">
+              <a:buFont typeface="Arial"/>
+              <a:buChar char="•"/>
+            </a:pPr>
+            <a:r>
+              <a:rPr lang="en-US" sz="2800" dirty="0" smtClean="0"/>
+              <a:t>Meme-</a:t>
+            </a:r>
+            <a:r>
+              <a:rPr lang="en-US" sz="2800" dirty="0" err="1" smtClean="0"/>
+              <a:t>afy</a:t>
+            </a:r>
+            <a:endParaRPr lang="en-US" sz="2800" dirty="0" smtClean="0"/>
+          </a:p>
+          <a:p>
+            <a:pPr marL="342900" indent="-342900">
+              <a:buFont typeface="Arial"/>
+              <a:buChar char="•"/>
+            </a:pPr>
+            <a:r>
+              <a:rPr lang="en-US" sz="2800" dirty="0" err="1" smtClean="0"/>
+              <a:t>Qt</a:t>
+            </a:r>
+            <a:r>
+              <a:rPr lang="en-US" sz="2800" dirty="0" smtClean="0"/>
+              <a:t> </a:t>
+            </a:r>
+            <a:r>
+              <a:rPr lang="en-US" sz="2800" dirty="0" err="1" smtClean="0"/>
+              <a:t>Gui</a:t>
+            </a:r>
+            <a:endParaRPr lang="en-US" sz="2800" dirty="0"/>
           </a:p>
         </p:txBody>
       </p:sp>
@@ -8580,25 +8992,6 @@
           </a:p>
         </p:txBody>
       </p:sp>
-      <p:sp>
-        <p:nvSpPr>
-          <p:cNvPr id="3" name="Text Placeholder 2"/>
-          <p:cNvSpPr>
-            <a:spLocks noGrp="1"/>
-          </p:cNvSpPr>
-          <p:nvPr>
-            <p:ph type="body" sz="half" idx="2"/>
-          </p:nvPr>
-        </p:nvSpPr>
-        <p:spPr/>
-        <p:txBody>
-          <a:bodyPr/>
-          <a:lstStyle/>
-          <a:p>
-            <a:endParaRPr lang="en-US" dirty="0"/>
-          </a:p>
-        </p:txBody>
-      </p:sp>
       <p:pic>
         <p:nvPicPr>
           <p:cNvPr id="5" name="Picture Placeholder 4" descr="d6232682-e0e0-4e01-b792-67cd8fe8ee2f.jpg"/>
@@ -8820,6 +9213,78 @@
                 </a:outerShdw>
               </a:effectLst>
             </a:endParaRPr>
+          </a:p>
+        </p:txBody>
+      </p:sp>
+      <p:sp>
+        <p:nvSpPr>
+          <p:cNvPr id="8" name="Text Placeholder 2"/>
+          <p:cNvSpPr>
+            <a:spLocks noGrp="1"/>
+          </p:cNvSpPr>
+          <p:nvPr>
+            <p:ph type="body" sz="half" idx="2"/>
+          </p:nvPr>
+        </p:nvSpPr>
+        <p:spPr/>
+        <p:txBody>
+          <a:bodyPr>
+            <a:normAutofit/>
+          </a:bodyPr>
+          <a:lstStyle/>
+          <a:p>
+            <a:pPr marL="342900" indent="-342900">
+              <a:buFont typeface="Arial"/>
+              <a:buChar char="•"/>
+            </a:pPr>
+            <a:r>
+              <a:rPr lang="en-US" sz="2800" dirty="0" smtClean="0"/>
+              <a:t>Server/Client Chat</a:t>
+            </a:r>
+          </a:p>
+          <a:p>
+            <a:pPr marL="342900" indent="-342900">
+              <a:buFont typeface="Arial"/>
+              <a:buChar char="•"/>
+            </a:pPr>
+            <a:r>
+              <a:rPr lang="en-US" sz="2800" dirty="0" smtClean="0"/>
+              <a:t>Encryption </a:t>
+            </a:r>
+          </a:p>
+          <a:p>
+            <a:pPr marL="342900" indent="-342900">
+              <a:buFont typeface="Arial"/>
+              <a:buChar char="•"/>
+            </a:pPr>
+            <a:r>
+              <a:rPr lang="en-US" sz="2800" dirty="0" smtClean="0"/>
+              <a:t>Meme-</a:t>
+            </a:r>
+            <a:r>
+              <a:rPr lang="en-US" sz="2800" dirty="0" err="1" smtClean="0"/>
+              <a:t>afy</a:t>
+            </a:r>
+            <a:endParaRPr lang="en-US" sz="2800" dirty="0" smtClean="0"/>
+          </a:p>
+          <a:p>
+            <a:pPr marL="342900" indent="-342900">
+              <a:buFont typeface="Arial"/>
+              <a:buChar char="•"/>
+            </a:pPr>
+            <a:r>
+              <a:rPr lang="en-US" sz="2800" dirty="0" err="1" smtClean="0"/>
+              <a:t>Qt</a:t>
+            </a:r>
+            <a:r>
+              <a:rPr lang="en-US" sz="2800" dirty="0" smtClean="0"/>
+              <a:t> </a:t>
+            </a:r>
+            <a:r>
+              <a:rPr lang="en-US" sz="2800" dirty="0" err="1" smtClean="0"/>
+              <a:t>Gui</a:t>
+            </a:r>
+            <a:endParaRPr lang="en-US" sz="2800" dirty="0"/>
           </a:p>
         </p:txBody>
       </p:sp>

</xml_diff>

<commit_message>
The presentation we never will use....
:’(
</commit_message>
<xml_diff>
--- a/Presentation/Project Presentation.pptx
+++ b/Presentation/Project Presentation.pptx
@@ -6039,7 +6039,7 @@
               <a:buChar char="•"/>
             </a:pPr>
             <a:r>
-              <a:rPr lang="en-US" sz="2800" dirty="0" smtClean="0"/>
+              <a:rPr lang="en-US" sz="2800" dirty="0"/>
               <a:t>Server/Client Chat</a:t>
             </a:r>
           </a:p>
@@ -6049,9 +6049,18 @@
               <a:buChar char="•"/>
             </a:pPr>
             <a:r>
-              <a:rPr lang="en-US" sz="2800" dirty="0" smtClean="0"/>
-              <a:t>Encryption </a:t>
-            </a:r>
+              <a:rPr lang="en-US" sz="2800" dirty="0" err="1"/>
+              <a:t>Qt</a:t>
+            </a:r>
+            <a:r>
+              <a:rPr lang="en-US" sz="2800" dirty="0"/>
+              <a:t> </a:t>
+            </a:r>
+            <a:r>
+              <a:rPr lang="en-US" sz="2800" dirty="0" err="1"/>
+              <a:t>Gui</a:t>
+            </a:r>
+            <a:endParaRPr lang="en-US" sz="2800" dirty="0"/>
           </a:p>
           <a:p>
             <a:pPr marL="342900" indent="-342900">
@@ -6059,14 +6068,14 @@
               <a:buChar char="•"/>
             </a:pPr>
             <a:r>
-              <a:rPr lang="en-US" sz="2800" dirty="0" smtClean="0"/>
+              <a:rPr lang="en-US" sz="2800" dirty="0"/>
               <a:t>Meme-</a:t>
             </a:r>
             <a:r>
-              <a:rPr lang="en-US" sz="2800" dirty="0" err="1" smtClean="0"/>
+              <a:rPr lang="en-US" sz="2800" dirty="0" err="1"/>
               <a:t>afy</a:t>
             </a:r>
-            <a:endParaRPr lang="en-US" sz="2800" dirty="0" smtClean="0"/>
+            <a:endParaRPr lang="en-US" sz="2800" dirty="0"/>
           </a:p>
           <a:p>
             <a:pPr marL="342900" indent="-342900">
@@ -6074,16 +6083,8 @@
               <a:buChar char="•"/>
             </a:pPr>
             <a:r>
-              <a:rPr lang="en-US" sz="2800" dirty="0" err="1" smtClean="0"/>
-              <a:t>Qt</a:t>
-            </a:r>
-            <a:r>
-              <a:rPr lang="en-US" sz="2800" dirty="0" smtClean="0"/>
-              <a:t> </a:t>
-            </a:r>
-            <a:r>
-              <a:rPr lang="en-US" sz="2800" dirty="0" err="1" smtClean="0"/>
-              <a:t>Gui</a:t>
+              <a:rPr lang="en-US" sz="2800"/>
+              <a:t>Encryption </a:t>
             </a:r>
             <a:endParaRPr lang="en-US" sz="2800" dirty="0"/>
           </a:p>
@@ -6240,19 +6241,6 @@
               <a:rPr lang="en-US" dirty="0" smtClean="0"/>
               <a:t>Server could not take pictures </a:t>
             </a:r>
-          </a:p>
-          <a:p>
-            <a:r>
-              <a:rPr lang="en-US" dirty="0" smtClean="0"/>
-              <a:t>GUI unexpectedly quits after encrypt class  is called</a:t>
-            </a:r>
-          </a:p>
-          <a:p>
-            <a:r>
-              <a:rPr lang="en-US" dirty="0" smtClean="0"/>
-              <a:t>The styling of the memes can be added upon</a:t>
-            </a:r>
-            <a:endParaRPr lang="en-US" dirty="0"/>
           </a:p>
         </p:txBody>
       </p:sp>
@@ -7181,9 +7169,18 @@
               <a:buChar char="•"/>
             </a:pPr>
             <a:r>
-              <a:rPr lang="en-US" sz="2800" dirty="0" smtClean="0"/>
-              <a:t>Encryption </a:t>
-            </a:r>
+              <a:rPr lang="en-US" sz="2800" dirty="0" err="1"/>
+              <a:t>Qt</a:t>
+            </a:r>
+            <a:r>
+              <a:rPr lang="en-US" sz="2800" dirty="0"/>
+              <a:t> </a:t>
+            </a:r>
+            <a:r>
+              <a:rPr lang="en-US" sz="2800" dirty="0" err="1" smtClean="0"/>
+              <a:t>Gui</a:t>
+            </a:r>
+            <a:endParaRPr lang="en-US" sz="2800" dirty="0" smtClean="0"/>
           </a:p>
           <a:p>
             <a:pPr marL="342900" indent="-342900">
@@ -7191,7 +7188,7 @@
               <a:buChar char="•"/>
             </a:pPr>
             <a:r>
-              <a:rPr lang="en-US" sz="2800" dirty="0" smtClean="0"/>
+              <a:rPr lang="en-US" sz="2800" dirty="0"/>
               <a:t>Meme-</a:t>
             </a:r>
             <a:r>
@@ -7206,18 +7203,9 @@
               <a:buChar char="•"/>
             </a:pPr>
             <a:r>
-              <a:rPr lang="en-US" sz="2800" dirty="0" err="1" smtClean="0"/>
-              <a:t>Qt</a:t>
-            </a:r>
-            <a:r>
               <a:rPr lang="en-US" sz="2800" dirty="0" smtClean="0"/>
-              <a:t> </a:t>
-            </a:r>
-            <a:r>
-              <a:rPr lang="en-US" sz="2800" dirty="0" err="1" smtClean="0"/>
-              <a:t>Gui</a:t>
-            </a:r>
-            <a:endParaRPr lang="en-US" sz="2800" dirty="0"/>
+              <a:t>Encryption </a:t>
+            </a:r>
           </a:p>
         </p:txBody>
       </p:sp>
@@ -7818,7 +7806,7 @@
               <a:buChar char="•"/>
             </a:pPr>
             <a:r>
-              <a:rPr lang="en-US" sz="2800" dirty="0" smtClean="0"/>
+              <a:rPr lang="en-US" sz="2800" dirty="0"/>
               <a:t>Server/Client Chat</a:t>
             </a:r>
           </a:p>
@@ -7828,9 +7816,18 @@
               <a:buChar char="•"/>
             </a:pPr>
             <a:r>
-              <a:rPr lang="en-US" sz="2800" dirty="0" smtClean="0"/>
-              <a:t>Encryption </a:t>
-            </a:r>
+              <a:rPr lang="en-US" sz="2800" dirty="0" err="1"/>
+              <a:t>Qt</a:t>
+            </a:r>
+            <a:r>
+              <a:rPr lang="en-US" sz="2800" dirty="0"/>
+              <a:t> </a:t>
+            </a:r>
+            <a:r>
+              <a:rPr lang="en-US" sz="2800" dirty="0" err="1"/>
+              <a:t>Gui</a:t>
+            </a:r>
+            <a:endParaRPr lang="en-US" sz="2800" dirty="0"/>
           </a:p>
           <a:p>
             <a:pPr marL="342900" indent="-342900">
@@ -7838,14 +7835,14 @@
               <a:buChar char="•"/>
             </a:pPr>
             <a:r>
-              <a:rPr lang="en-US" sz="2800" dirty="0" smtClean="0"/>
+              <a:rPr lang="en-US" sz="2800" dirty="0"/>
               <a:t>Meme-</a:t>
             </a:r>
             <a:r>
-              <a:rPr lang="en-US" sz="2800" dirty="0" err="1" smtClean="0"/>
+              <a:rPr lang="en-US" sz="2800" dirty="0" err="1"/>
               <a:t>afy</a:t>
             </a:r>
-            <a:endParaRPr lang="en-US" sz="2800" dirty="0" smtClean="0"/>
+            <a:endParaRPr lang="en-US" sz="2800" dirty="0"/>
           </a:p>
           <a:p>
             <a:pPr marL="342900" indent="-342900">
@@ -7853,18 +7850,9 @@
               <a:buChar char="•"/>
             </a:pPr>
             <a:r>
-              <a:rPr lang="en-US" sz="2800" dirty="0" err="1" smtClean="0"/>
-              <a:t>Qt</a:t>
-            </a:r>
-            <a:r>
-              <a:rPr lang="en-US" sz="2800" dirty="0" smtClean="0"/>
-              <a:t> </a:t>
-            </a:r>
-            <a:r>
-              <a:rPr lang="en-US" sz="2800" dirty="0" err="1" smtClean="0"/>
-              <a:t>Gui</a:t>
-            </a:r>
-            <a:endParaRPr lang="en-US" sz="2800" dirty="0"/>
+              <a:rPr lang="en-US" sz="2800" dirty="0"/>
+              <a:t>Encryption </a:t>
+            </a:r>
           </a:p>
         </p:txBody>
       </p:sp>
@@ -8174,7 +8162,7 @@
               <a:buChar char="•"/>
             </a:pPr>
             <a:r>
-              <a:rPr lang="en-US" sz="2800" dirty="0" smtClean="0"/>
+              <a:rPr lang="en-US" sz="2800" dirty="0"/>
               <a:t>Server/Client Chat</a:t>
             </a:r>
           </a:p>
@@ -8184,9 +8172,18 @@
               <a:buChar char="•"/>
             </a:pPr>
             <a:r>
-              <a:rPr lang="en-US" sz="2800" dirty="0" smtClean="0"/>
-              <a:t>Encryption </a:t>
-            </a:r>
+              <a:rPr lang="en-US" sz="2800" dirty="0" err="1"/>
+              <a:t>Qt</a:t>
+            </a:r>
+            <a:r>
+              <a:rPr lang="en-US" sz="2800" dirty="0"/>
+              <a:t> </a:t>
+            </a:r>
+            <a:r>
+              <a:rPr lang="en-US" sz="2800" dirty="0" err="1"/>
+              <a:t>Gui</a:t>
+            </a:r>
+            <a:endParaRPr lang="en-US" sz="2800" dirty="0"/>
           </a:p>
           <a:p>
             <a:pPr marL="342900" indent="-342900">
@@ -8194,14 +8191,14 @@
               <a:buChar char="•"/>
             </a:pPr>
             <a:r>
-              <a:rPr lang="en-US" sz="2800" dirty="0" smtClean="0"/>
+              <a:rPr lang="en-US" sz="2800" dirty="0"/>
               <a:t>Meme-</a:t>
             </a:r>
             <a:r>
-              <a:rPr lang="en-US" sz="2800" dirty="0" err="1" smtClean="0"/>
+              <a:rPr lang="en-US" sz="2800" dirty="0" err="1"/>
               <a:t>afy</a:t>
             </a:r>
-            <a:endParaRPr lang="en-US" sz="2800" dirty="0" smtClean="0"/>
+            <a:endParaRPr lang="en-US" sz="2800" dirty="0"/>
           </a:p>
           <a:p>
             <a:pPr marL="342900" indent="-342900">
@@ -8209,18 +8206,9 @@
               <a:buChar char="•"/>
             </a:pPr>
             <a:r>
-              <a:rPr lang="en-US" sz="2800" dirty="0" err="1" smtClean="0"/>
-              <a:t>Qt</a:t>
-            </a:r>
-            <a:r>
-              <a:rPr lang="en-US" sz="2800" dirty="0" smtClean="0"/>
-              <a:t> </a:t>
-            </a:r>
-            <a:r>
-              <a:rPr lang="en-US" sz="2800" dirty="0" err="1" smtClean="0"/>
-              <a:t>Gui</a:t>
-            </a:r>
-            <a:endParaRPr lang="en-US" sz="2800" dirty="0"/>
+              <a:rPr lang="en-US" sz="2800" dirty="0"/>
+              <a:t>Encryption </a:t>
+            </a:r>
           </a:p>
         </p:txBody>
       </p:sp>
@@ -8530,7 +8518,7 @@
               <a:buChar char="•"/>
             </a:pPr>
             <a:r>
-              <a:rPr lang="en-US" sz="2800" dirty="0" smtClean="0"/>
+              <a:rPr lang="en-US" sz="2800" dirty="0"/>
               <a:t>Server/Client Chat</a:t>
             </a:r>
           </a:p>
@@ -8540,9 +8528,18 @@
               <a:buChar char="•"/>
             </a:pPr>
             <a:r>
-              <a:rPr lang="en-US" sz="2800" dirty="0" smtClean="0"/>
-              <a:t>Encryption </a:t>
-            </a:r>
+              <a:rPr lang="en-US" sz="2800" dirty="0" err="1"/>
+              <a:t>Qt</a:t>
+            </a:r>
+            <a:r>
+              <a:rPr lang="en-US" sz="2800" dirty="0"/>
+              <a:t> </a:t>
+            </a:r>
+            <a:r>
+              <a:rPr lang="en-US" sz="2800" dirty="0" err="1"/>
+              <a:t>Gui</a:t>
+            </a:r>
+            <a:endParaRPr lang="en-US" sz="2800" dirty="0"/>
           </a:p>
           <a:p>
             <a:pPr marL="342900" indent="-342900">
@@ -8550,14 +8547,14 @@
               <a:buChar char="•"/>
             </a:pPr>
             <a:r>
-              <a:rPr lang="en-US" sz="2800" dirty="0" smtClean="0"/>
+              <a:rPr lang="en-US" sz="2800" dirty="0"/>
               <a:t>Meme-</a:t>
             </a:r>
             <a:r>
-              <a:rPr lang="en-US" sz="2800" dirty="0" err="1" smtClean="0"/>
+              <a:rPr lang="en-US" sz="2800" dirty="0" err="1"/>
               <a:t>afy</a:t>
             </a:r>
-            <a:endParaRPr lang="en-US" sz="2800" dirty="0" smtClean="0"/>
+            <a:endParaRPr lang="en-US" sz="2800" dirty="0"/>
           </a:p>
           <a:p>
             <a:pPr marL="342900" indent="-342900">
@@ -8565,18 +8562,9 @@
               <a:buChar char="•"/>
             </a:pPr>
             <a:r>
-              <a:rPr lang="en-US" sz="2800" dirty="0" err="1" smtClean="0"/>
-              <a:t>Qt</a:t>
-            </a:r>
-            <a:r>
-              <a:rPr lang="en-US" sz="2800" dirty="0" smtClean="0"/>
-              <a:t> </a:t>
-            </a:r>
-            <a:r>
-              <a:rPr lang="en-US" sz="2800" dirty="0" err="1" smtClean="0"/>
-              <a:t>Gui</a:t>
-            </a:r>
-            <a:endParaRPr lang="en-US" sz="2800" dirty="0"/>
+              <a:rPr lang="en-US" sz="2800" dirty="0"/>
+              <a:t>Encryption </a:t>
+            </a:r>
           </a:p>
         </p:txBody>
       </p:sp>
@@ -8886,7 +8874,7 @@
               <a:buChar char="•"/>
             </a:pPr>
             <a:r>
-              <a:rPr lang="en-US" sz="2800" dirty="0" smtClean="0"/>
+              <a:rPr lang="en-US" sz="2800" dirty="0"/>
               <a:t>Server/Client Chat</a:t>
             </a:r>
           </a:p>
@@ -8896,9 +8884,18 @@
               <a:buChar char="•"/>
             </a:pPr>
             <a:r>
-              <a:rPr lang="en-US" sz="2800" dirty="0" smtClean="0"/>
-              <a:t>Encryption </a:t>
-            </a:r>
+              <a:rPr lang="en-US" sz="2800" dirty="0" err="1"/>
+              <a:t>Qt</a:t>
+            </a:r>
+            <a:r>
+              <a:rPr lang="en-US" sz="2800" dirty="0"/>
+              <a:t> </a:t>
+            </a:r>
+            <a:r>
+              <a:rPr lang="en-US" sz="2800" dirty="0" err="1"/>
+              <a:t>Gui</a:t>
+            </a:r>
+            <a:endParaRPr lang="en-US" sz="2800" dirty="0"/>
           </a:p>
           <a:p>
             <a:pPr marL="342900" indent="-342900">
@@ -8906,14 +8903,14 @@
               <a:buChar char="•"/>
             </a:pPr>
             <a:r>
-              <a:rPr lang="en-US" sz="2800" dirty="0" smtClean="0"/>
+              <a:rPr lang="en-US" sz="2800" dirty="0"/>
               <a:t>Meme-</a:t>
             </a:r>
             <a:r>
-              <a:rPr lang="en-US" sz="2800" dirty="0" err="1" smtClean="0"/>
+              <a:rPr lang="en-US" sz="2800" dirty="0" err="1"/>
               <a:t>afy</a:t>
             </a:r>
-            <a:endParaRPr lang="en-US" sz="2800" dirty="0" smtClean="0"/>
+            <a:endParaRPr lang="en-US" sz="2800" dirty="0"/>
           </a:p>
           <a:p>
             <a:pPr marL="342900" indent="-342900">
@@ -8921,18 +8918,9 @@
               <a:buChar char="•"/>
             </a:pPr>
             <a:r>
-              <a:rPr lang="en-US" sz="2800" dirty="0" err="1" smtClean="0"/>
-              <a:t>Qt</a:t>
-            </a:r>
-            <a:r>
-              <a:rPr lang="en-US" sz="2800" dirty="0" smtClean="0"/>
-              <a:t> </a:t>
-            </a:r>
-            <a:r>
-              <a:rPr lang="en-US" sz="2800" dirty="0" err="1" smtClean="0"/>
-              <a:t>Gui</a:t>
-            </a:r>
-            <a:endParaRPr lang="en-US" sz="2800" dirty="0"/>
+              <a:rPr lang="en-US" sz="2800" dirty="0"/>
+              <a:t>Encryption </a:t>
+            </a:r>
           </a:p>
         </p:txBody>
       </p:sp>
@@ -9242,7 +9230,7 @@
               <a:buChar char="•"/>
             </a:pPr>
             <a:r>
-              <a:rPr lang="en-US" sz="2800" dirty="0" smtClean="0"/>
+              <a:rPr lang="en-US" sz="2800" dirty="0"/>
               <a:t>Server/Client Chat</a:t>
             </a:r>
           </a:p>
@@ -9252,9 +9240,18 @@
               <a:buChar char="•"/>
             </a:pPr>
             <a:r>
-              <a:rPr lang="en-US" sz="2800" dirty="0" smtClean="0"/>
-              <a:t>Encryption </a:t>
-            </a:r>
+              <a:rPr lang="en-US" sz="2800" dirty="0" err="1"/>
+              <a:t>Qt</a:t>
+            </a:r>
+            <a:r>
+              <a:rPr lang="en-US" sz="2800" dirty="0"/>
+              <a:t> </a:t>
+            </a:r>
+            <a:r>
+              <a:rPr lang="en-US" sz="2800" dirty="0" err="1"/>
+              <a:t>Gui</a:t>
+            </a:r>
+            <a:endParaRPr lang="en-US" sz="2800" dirty="0"/>
           </a:p>
           <a:p>
             <a:pPr marL="342900" indent="-342900">
@@ -9262,14 +9259,14 @@
               <a:buChar char="•"/>
             </a:pPr>
             <a:r>
-              <a:rPr lang="en-US" sz="2800" dirty="0" smtClean="0"/>
+              <a:rPr lang="en-US" sz="2800" dirty="0"/>
               <a:t>Meme-</a:t>
             </a:r>
             <a:r>
-              <a:rPr lang="en-US" sz="2800" dirty="0" err="1" smtClean="0"/>
+              <a:rPr lang="en-US" sz="2800" dirty="0" err="1"/>
               <a:t>afy</a:t>
             </a:r>
-            <a:endParaRPr lang="en-US" sz="2800" dirty="0" smtClean="0"/>
+            <a:endParaRPr lang="en-US" sz="2800" dirty="0"/>
           </a:p>
           <a:p>
             <a:pPr marL="342900" indent="-342900">
@@ -9277,18 +9274,9 @@
               <a:buChar char="•"/>
             </a:pPr>
             <a:r>
-              <a:rPr lang="en-US" sz="2800" dirty="0" err="1" smtClean="0"/>
-              <a:t>Qt</a:t>
-            </a:r>
-            <a:r>
-              <a:rPr lang="en-US" sz="2800" dirty="0" smtClean="0"/>
-              <a:t> </a:t>
-            </a:r>
-            <a:r>
-              <a:rPr lang="en-US" sz="2800" dirty="0" err="1" smtClean="0"/>
-              <a:t>Gui</a:t>
-            </a:r>
-            <a:endParaRPr lang="en-US" sz="2800" dirty="0"/>
+              <a:rPr lang="en-US" sz="2800" dirty="0"/>
+              <a:t>Encryption </a:t>
+            </a:r>
           </a:p>
         </p:txBody>
       </p:sp>

</xml_diff>